<commit_message>
updated notes with python3.6 as versino for use
</commit_message>
<xml_diff>
--- a/week01-pys.pptx
+++ b/week01-pys.pptx
@@ -250,7 +250,7 @@
           <a:p>
             <a:fld id="{304583AB-A02D-442B-9092-E1C2F6E6AD26}" type="datetimeFigureOut">
               <a:rPr lang="en-US" smtClean="0"/>
-              <a:t>2017-02-06</a:t>
+              <a:t>2/7/17</a:t>
             </a:fld>
             <a:endParaRPr lang="en-US"/>
           </a:p>
@@ -418,7 +418,7 @@
           <a:p>
             <a:fld id="{304583AB-A02D-442B-9092-E1C2F6E6AD26}" type="datetimeFigureOut">
               <a:rPr lang="en-US" smtClean="0"/>
-              <a:t>2017-02-06</a:t>
+              <a:t>2/7/17</a:t>
             </a:fld>
             <a:endParaRPr lang="en-US"/>
           </a:p>
@@ -596,7 +596,7 @@
           <a:p>
             <a:fld id="{304583AB-A02D-442B-9092-E1C2F6E6AD26}" type="datetimeFigureOut">
               <a:rPr lang="en-US" smtClean="0"/>
-              <a:t>2017-02-06</a:t>
+              <a:t>2/7/17</a:t>
             </a:fld>
             <a:endParaRPr lang="en-US"/>
           </a:p>
@@ -764,7 +764,7 @@
           <a:p>
             <a:fld id="{304583AB-A02D-442B-9092-E1C2F6E6AD26}" type="datetimeFigureOut">
               <a:rPr lang="en-US" smtClean="0"/>
-              <a:t>2017-02-06</a:t>
+              <a:t>2/7/17</a:t>
             </a:fld>
             <a:endParaRPr lang="en-US"/>
           </a:p>
@@ -1009,7 +1009,7 @@
           <a:p>
             <a:fld id="{304583AB-A02D-442B-9092-E1C2F6E6AD26}" type="datetimeFigureOut">
               <a:rPr lang="en-US" smtClean="0"/>
-              <a:t>2017-02-06</a:t>
+              <a:t>2/7/17</a:t>
             </a:fld>
             <a:endParaRPr lang="en-US"/>
           </a:p>
@@ -1238,7 +1238,7 @@
           <a:p>
             <a:fld id="{304583AB-A02D-442B-9092-E1C2F6E6AD26}" type="datetimeFigureOut">
               <a:rPr lang="en-US" smtClean="0"/>
-              <a:t>2017-02-06</a:t>
+              <a:t>2/7/17</a:t>
             </a:fld>
             <a:endParaRPr lang="en-US"/>
           </a:p>
@@ -1602,7 +1602,7 @@
           <a:p>
             <a:fld id="{304583AB-A02D-442B-9092-E1C2F6E6AD26}" type="datetimeFigureOut">
               <a:rPr lang="en-US" smtClean="0"/>
-              <a:t>2017-02-06</a:t>
+              <a:t>2/7/17</a:t>
             </a:fld>
             <a:endParaRPr lang="en-US"/>
           </a:p>
@@ -1719,7 +1719,7 @@
           <a:p>
             <a:fld id="{304583AB-A02D-442B-9092-E1C2F6E6AD26}" type="datetimeFigureOut">
               <a:rPr lang="en-US" smtClean="0"/>
-              <a:t>2017-02-06</a:t>
+              <a:t>2/7/17</a:t>
             </a:fld>
             <a:endParaRPr lang="en-US"/>
           </a:p>
@@ -1814,7 +1814,7 @@
           <a:p>
             <a:fld id="{304583AB-A02D-442B-9092-E1C2F6E6AD26}" type="datetimeFigureOut">
               <a:rPr lang="en-US" smtClean="0"/>
-              <a:t>2017-02-06</a:t>
+              <a:t>2/7/17</a:t>
             </a:fld>
             <a:endParaRPr lang="en-US"/>
           </a:p>
@@ -2089,7 +2089,7 @@
           <a:p>
             <a:fld id="{304583AB-A02D-442B-9092-E1C2F6E6AD26}" type="datetimeFigureOut">
               <a:rPr lang="en-US" smtClean="0"/>
-              <a:t>2017-02-06</a:t>
+              <a:t>2/7/17</a:t>
             </a:fld>
             <a:endParaRPr lang="en-US"/>
           </a:p>
@@ -2341,7 +2341,7 @@
           <a:p>
             <a:fld id="{304583AB-A02D-442B-9092-E1C2F6E6AD26}" type="datetimeFigureOut">
               <a:rPr lang="en-US" smtClean="0"/>
-              <a:t>2017-02-06</a:t>
+              <a:t>2/7/17</a:t>
             </a:fld>
             <a:endParaRPr lang="en-US"/>
           </a:p>
@@ -2552,7 +2552,7 @@
           <a:p>
             <a:fld id="{304583AB-A02D-442B-9092-E1C2F6E6AD26}" type="datetimeFigureOut">
               <a:rPr lang="en-US" smtClean="0"/>
-              <a:t>2017-02-06</a:t>
+              <a:t>2/7/17</a:t>
             </a:fld>
             <a:endParaRPr lang="en-US"/>
           </a:p>
@@ -3015,6 +3015,13 @@
   <p:clrMapOvr>
     <a:masterClrMapping/>
   </p:clrMapOvr>
+  <p:timing>
+    <p:tnLst>
+      <p:par>
+        <p:cTn id="1" dur="indefinite" restart="never" nodeType="tmRoot"/>
+      </p:par>
+    </p:tnLst>
+  </p:timing>
 </p:sld>
 </file>
 
@@ -3086,12 +3093,28 @@
               <a:t>What we’ll use? </a:t>
             </a:r>
             <a:r>
+              <a:rPr lang="en-US">
+                <a:solidFill>
+                  <a:srgbClr val="FF0000"/>
+                </a:solidFill>
+              </a:rPr>
+              <a:t>Python </a:t>
+            </a:r>
+            <a:r>
+              <a:rPr lang="en-US" smtClean="0">
+                <a:solidFill>
+                  <a:srgbClr val="FF0000"/>
+                </a:solidFill>
+              </a:rPr>
+              <a:t>3.6.0 </a:t>
+            </a:r>
+            <a:r>
               <a:rPr lang="en-US" dirty="0">
                 <a:solidFill>
                   <a:srgbClr val="FF0000"/>
                 </a:solidFill>
               </a:rPr>
-              <a:t>Python 3.5.2 and IDLE3</a:t>
+              <a:t>and IDLE3</a:t>
             </a:r>
           </a:p>
           <a:p>
@@ -3314,6 +3337,13 @@
   <p:clrMapOvr>
     <a:masterClrMapping/>
   </p:clrMapOvr>
+  <p:timing>
+    <p:tnLst>
+      <p:par>
+        <p:cTn id="1" dur="indefinite" restart="never" nodeType="tmRoot"/>
+      </p:par>
+    </p:tnLst>
+  </p:timing>
 </p:sld>
 </file>
 
@@ -3434,6 +3464,13 @@
   <p:clrMapOvr>
     <a:masterClrMapping/>
   </p:clrMapOvr>
+  <p:timing>
+    <p:tnLst>
+      <p:par>
+        <p:cTn id="1" dur="indefinite" restart="never" nodeType="tmRoot"/>
+      </p:par>
+    </p:tnLst>
+  </p:timing>
 </p:sld>
 </file>
 
@@ -3677,6 +3714,13 @@
   <p:clrMapOvr>
     <a:masterClrMapping/>
   </p:clrMapOvr>
+  <p:timing>
+    <p:tnLst>
+      <p:par>
+        <p:cTn id="1" dur="indefinite" restart="never" nodeType="tmRoot"/>
+      </p:par>
+    </p:tnLst>
+  </p:timing>
 </p:sld>
 </file>
 
@@ -3854,6 +3898,13 @@
   <p:clrMapOvr>
     <a:masterClrMapping/>
   </p:clrMapOvr>
+  <p:timing>
+    <p:tnLst>
+      <p:par>
+        <p:cTn id="1" dur="indefinite" restart="never" nodeType="tmRoot"/>
+      </p:par>
+    </p:tnLst>
+  </p:timing>
 </p:sld>
 </file>
 
@@ -3952,6 +4003,13 @@
   <p:clrMapOvr>
     <a:masterClrMapping/>
   </p:clrMapOvr>
+  <p:timing>
+    <p:tnLst>
+      <p:par>
+        <p:cTn id="1" dur="indefinite" restart="never" nodeType="tmRoot"/>
+      </p:par>
+    </p:tnLst>
+  </p:timing>
 </p:sld>
 </file>
 
@@ -4105,6 +4163,13 @@
   <p:clrMapOvr>
     <a:masterClrMapping/>
   </p:clrMapOvr>
+  <p:timing>
+    <p:tnLst>
+      <p:par>
+        <p:cTn id="1" dur="indefinite" restart="never" nodeType="tmRoot"/>
+      </p:par>
+    </p:tnLst>
+  </p:timing>
 </p:sld>
 </file>
 
@@ -4238,6 +4303,13 @@
   <p:clrMapOvr>
     <a:masterClrMapping/>
   </p:clrMapOvr>
+  <p:timing>
+    <p:tnLst>
+      <p:par>
+        <p:cTn id="1" dur="indefinite" restart="never" nodeType="tmRoot"/>
+      </p:par>
+    </p:tnLst>
+  </p:timing>
 </p:sld>
 </file>
 
@@ -4330,6 +4402,13 @@
   <p:clrMapOvr>
     <a:masterClrMapping/>
   </p:clrMapOvr>
+  <p:timing>
+    <p:tnLst>
+      <p:par>
+        <p:cTn id="1" dur="indefinite" restart="never" nodeType="tmRoot"/>
+      </p:par>
+    </p:tnLst>
+  </p:timing>
 </p:sld>
 </file>
 
@@ -4422,6 +4501,13 @@
   <p:clrMapOvr>
     <a:masterClrMapping/>
   </p:clrMapOvr>
+  <p:timing>
+    <p:tnLst>
+      <p:par>
+        <p:cTn id="1" dur="indefinite" restart="never" nodeType="tmRoot"/>
+      </p:par>
+    </p:tnLst>
+  </p:timing>
 </p:sld>
 </file>
 

</xml_diff>